<commit_message>
Update Zygo App Structure
</commit_message>
<xml_diff>
--- a/applis/Zygo-labwork/Structure_of_the_app.pptx
+++ b/applis/Zygo-labwork/Structure_of_the_app.pptx
@@ -6407,6 +6407,758 @@
           </p:txBody>
         </p:sp>
       </p:grpSp>
+      <p:graphicFrame>
+        <p:nvGraphicFramePr>
+          <p:cNvPr id="13" name="Tableau 12">
+            <a:extLst>
+              <a:ext uri="{FF2B5EF4-FFF2-40B4-BE49-F238E27FC236}">
+                <a16:creationId xmlns:a16="http://schemas.microsoft.com/office/drawing/2014/main" id="{3D14650D-0974-0D9E-4C71-B59158C789B3}"/>
+              </a:ext>
+            </a:extLst>
+          </p:cNvPr>
+          <p:cNvGraphicFramePr>
+            <a:graphicFrameLocks noGrp="1"/>
+          </p:cNvGraphicFramePr>
+          <p:nvPr>
+            <p:extLst>
+              <p:ext uri="{D42A27DB-BD31-4B8C-83A1-F6EECF244321}">
+                <p14:modId xmlns:p14="http://schemas.microsoft.com/office/powerpoint/2010/main" val="887141976"/>
+              </p:ext>
+            </p:extLst>
+          </p:nvPr>
+        </p:nvGraphicFramePr>
+        <p:xfrm>
+          <a:off x="4602902" y="4810526"/>
+          <a:ext cx="1883728" cy="748596"/>
+        </p:xfrm>
+        <a:graphic>
+          <a:graphicData uri="http://schemas.openxmlformats.org/drawingml/2006/table">
+            <a:tbl>
+              <a:tblPr firstRow="1">
+                <a:tableStyleId>{284E427A-3D55-4303-BF80-6455036E1DE7}</a:tableStyleId>
+              </a:tblPr>
+              <a:tblGrid>
+                <a:gridCol w="269104">
+                  <a:extLst>
+                    <a:ext uri="{9D8B030D-6E8A-4147-A177-3AD203B41FA5}">
+                      <a16:colId xmlns:a16="http://schemas.microsoft.com/office/drawing/2014/main" val="3629675326"/>
+                    </a:ext>
+                  </a:extLst>
+                </a:gridCol>
+                <a:gridCol w="269104">
+                  <a:extLst>
+                    <a:ext uri="{9D8B030D-6E8A-4147-A177-3AD203B41FA5}">
+                      <a16:colId xmlns:a16="http://schemas.microsoft.com/office/drawing/2014/main" val="1638662622"/>
+                    </a:ext>
+                  </a:extLst>
+                </a:gridCol>
+                <a:gridCol w="269104">
+                  <a:extLst>
+                    <a:ext uri="{9D8B030D-6E8A-4147-A177-3AD203B41FA5}">
+                      <a16:colId xmlns:a16="http://schemas.microsoft.com/office/drawing/2014/main" val="3571151943"/>
+                    </a:ext>
+                  </a:extLst>
+                </a:gridCol>
+                <a:gridCol w="269104">
+                  <a:extLst>
+                    <a:ext uri="{9D8B030D-6E8A-4147-A177-3AD203B41FA5}">
+                      <a16:colId xmlns:a16="http://schemas.microsoft.com/office/drawing/2014/main" val="1566257407"/>
+                    </a:ext>
+                  </a:extLst>
+                </a:gridCol>
+                <a:gridCol w="269104">
+                  <a:extLst>
+                    <a:ext uri="{9D8B030D-6E8A-4147-A177-3AD203B41FA5}">
+                      <a16:colId xmlns:a16="http://schemas.microsoft.com/office/drawing/2014/main" val="684904652"/>
+                    </a:ext>
+                  </a:extLst>
+                </a:gridCol>
+                <a:gridCol w="269104">
+                  <a:extLst>
+                    <a:ext uri="{9D8B030D-6E8A-4147-A177-3AD203B41FA5}">
+                      <a16:colId xmlns:a16="http://schemas.microsoft.com/office/drawing/2014/main" val="2045673248"/>
+                    </a:ext>
+                  </a:extLst>
+                </a:gridCol>
+                <a:gridCol w="269104">
+                  <a:extLst>
+                    <a:ext uri="{9D8B030D-6E8A-4147-A177-3AD203B41FA5}">
+                      <a16:colId xmlns:a16="http://schemas.microsoft.com/office/drawing/2014/main" val="4108038552"/>
+                    </a:ext>
+                  </a:extLst>
+                </a:gridCol>
+              </a:tblGrid>
+              <a:tr h="249532">
+                <a:tc>
+                  <a:txBody>
+                    <a:bodyPr/>
+                    <a:lstStyle/>
+                    <a:p>
+                      <a:pPr algn="ctr"/>
+                      <a:endParaRPr lang="fr-FR" sz="600" b="0" dirty="0"/>
+                    </a:p>
+                  </a:txBody>
+                  <a:tcPr marL="0" marR="0" marT="0" marB="0" anchor="ctr"/>
+                </a:tc>
+                <a:tc>
+                  <a:txBody>
+                    <a:bodyPr/>
+                    <a:lstStyle/>
+                    <a:p>
+                      <a:pPr algn="ctr"/>
+                      <a:endParaRPr lang="fr-FR" sz="600" b="0" dirty="0"/>
+                    </a:p>
+                  </a:txBody>
+                  <a:tcPr marL="0" marR="0" marT="0" marB="0" anchor="ctr"/>
+                </a:tc>
+                <a:tc>
+                  <a:txBody>
+                    <a:bodyPr/>
+                    <a:lstStyle/>
+                    <a:p>
+                      <a:pPr algn="ctr"/>
+                      <a:endParaRPr lang="fr-FR" sz="600" b="0" dirty="0"/>
+                    </a:p>
+                  </a:txBody>
+                  <a:tcPr marL="0" marR="0" marT="0" marB="0" anchor="ctr"/>
+                </a:tc>
+                <a:tc>
+                  <a:txBody>
+                    <a:bodyPr/>
+                    <a:lstStyle/>
+                    <a:p>
+                      <a:pPr algn="ctr"/>
+                      <a:endParaRPr lang="fr-FR" sz="600" b="0" dirty="0"/>
+                    </a:p>
+                  </a:txBody>
+                  <a:tcPr marL="0" marR="0" marT="0" marB="0" anchor="ctr"/>
+                </a:tc>
+                <a:tc>
+                  <a:txBody>
+                    <a:bodyPr/>
+                    <a:lstStyle/>
+                    <a:p>
+                      <a:pPr algn="ctr"/>
+                      <a:endParaRPr lang="fr-FR" sz="600" b="0" dirty="0"/>
+                    </a:p>
+                  </a:txBody>
+                  <a:tcPr marL="0" marR="0" marT="0" marB="0" anchor="ctr"/>
+                </a:tc>
+                <a:tc>
+                  <a:txBody>
+                    <a:bodyPr/>
+                    <a:lstStyle/>
+                    <a:p>
+                      <a:pPr algn="ctr"/>
+                      <a:endParaRPr lang="fr-FR" sz="600" b="0" dirty="0"/>
+                    </a:p>
+                  </a:txBody>
+                  <a:tcPr marL="0" marR="0" marT="0" marB="0" anchor="ctr"/>
+                </a:tc>
+                <a:tc>
+                  <a:txBody>
+                    <a:bodyPr/>
+                    <a:lstStyle/>
+                    <a:p>
+                      <a:pPr algn="ctr"/>
+                      <a:endParaRPr lang="fr-FR" sz="600" b="0" dirty="0"/>
+                    </a:p>
+                  </a:txBody>
+                  <a:tcPr marL="0" marR="0" marT="0" marB="0" anchor="ctr"/>
+                </a:tc>
+                <a:extLst>
+                  <a:ext uri="{0D108BD9-81ED-4DB2-BD59-A6C34878D82A}">
+                    <a16:rowId xmlns:a16="http://schemas.microsoft.com/office/drawing/2014/main" val="401024579"/>
+                  </a:ext>
+                </a:extLst>
+              </a:tr>
+              <a:tr h="249532">
+                <a:tc>
+                  <a:txBody>
+                    <a:bodyPr/>
+                    <a:lstStyle/>
+                    <a:p>
+                      <a:pPr algn="ctr"/>
+                      <a:endParaRPr lang="fr-FR" sz="600" b="0" dirty="0"/>
+                    </a:p>
+                  </a:txBody>
+                  <a:tcPr marL="0" marR="0" marT="0" marB="0" anchor="ctr"/>
+                </a:tc>
+                <a:tc>
+                  <a:txBody>
+                    <a:bodyPr/>
+                    <a:lstStyle/>
+                    <a:p>
+                      <a:pPr algn="ctr"/>
+                      <a:endParaRPr lang="fr-FR" sz="600" b="0" dirty="0"/>
+                    </a:p>
+                  </a:txBody>
+                  <a:tcPr marL="0" marR="0" marT="0" marB="0" anchor="ctr"/>
+                </a:tc>
+                <a:tc>
+                  <a:txBody>
+                    <a:bodyPr/>
+                    <a:lstStyle/>
+                    <a:p>
+                      <a:pPr algn="ctr"/>
+                      <a:endParaRPr lang="fr-FR" sz="600" b="0" dirty="0"/>
+                    </a:p>
+                  </a:txBody>
+                  <a:tcPr marL="0" marR="0" marT="0" marB="0" anchor="ctr"/>
+                </a:tc>
+                <a:tc>
+                  <a:txBody>
+                    <a:bodyPr/>
+                    <a:lstStyle/>
+                    <a:p>
+                      <a:pPr algn="ctr"/>
+                      <a:endParaRPr lang="fr-FR" sz="600" b="0" dirty="0"/>
+                    </a:p>
+                  </a:txBody>
+                  <a:tcPr marL="0" marR="0" marT="0" marB="0" anchor="ctr"/>
+                </a:tc>
+                <a:tc>
+                  <a:txBody>
+                    <a:bodyPr/>
+                    <a:lstStyle/>
+                    <a:p>
+                      <a:pPr algn="ctr"/>
+                      <a:endParaRPr lang="fr-FR" sz="600" b="0" dirty="0"/>
+                    </a:p>
+                  </a:txBody>
+                  <a:tcPr marL="0" marR="0" marT="0" marB="0" anchor="ctr"/>
+                </a:tc>
+                <a:tc>
+                  <a:txBody>
+                    <a:bodyPr/>
+                    <a:lstStyle/>
+                    <a:p>
+                      <a:pPr algn="ctr"/>
+                      <a:endParaRPr lang="fr-FR" sz="600" b="0" dirty="0"/>
+                    </a:p>
+                  </a:txBody>
+                  <a:tcPr marL="0" marR="0" marT="0" marB="0" anchor="ctr"/>
+                </a:tc>
+                <a:tc>
+                  <a:txBody>
+                    <a:bodyPr/>
+                    <a:lstStyle/>
+                    <a:p>
+                      <a:pPr algn="ctr"/>
+                      <a:endParaRPr lang="fr-FR" sz="600" b="0"/>
+                    </a:p>
+                  </a:txBody>
+                  <a:tcPr marL="0" marR="0" marT="0" marB="0" anchor="ctr"/>
+                </a:tc>
+                <a:extLst>
+                  <a:ext uri="{0D108BD9-81ED-4DB2-BD59-A6C34878D82A}">
+                    <a16:rowId xmlns:a16="http://schemas.microsoft.com/office/drawing/2014/main" val="464496667"/>
+                  </a:ext>
+                </a:extLst>
+              </a:tr>
+              <a:tr h="249532">
+                <a:tc>
+                  <a:txBody>
+                    <a:bodyPr/>
+                    <a:lstStyle/>
+                    <a:p>
+                      <a:pPr algn="ctr"/>
+                      <a:endParaRPr lang="fr-FR" sz="600" b="0" dirty="0"/>
+                    </a:p>
+                  </a:txBody>
+                  <a:tcPr marL="0" marR="0" marT="0" marB="0" anchor="ctr"/>
+                </a:tc>
+                <a:tc>
+                  <a:txBody>
+                    <a:bodyPr/>
+                    <a:lstStyle/>
+                    <a:p>
+                      <a:pPr algn="ctr"/>
+                      <a:endParaRPr lang="fr-FR" sz="600" b="0"/>
+                    </a:p>
+                  </a:txBody>
+                  <a:tcPr marL="0" marR="0" marT="0" marB="0" anchor="ctr"/>
+                </a:tc>
+                <a:tc>
+                  <a:txBody>
+                    <a:bodyPr/>
+                    <a:lstStyle/>
+                    <a:p>
+                      <a:pPr algn="ctr"/>
+                      <a:endParaRPr lang="fr-FR" sz="600" b="0"/>
+                    </a:p>
+                  </a:txBody>
+                  <a:tcPr marL="0" marR="0" marT="0" marB="0" anchor="ctr"/>
+                </a:tc>
+                <a:tc>
+                  <a:txBody>
+                    <a:bodyPr/>
+                    <a:lstStyle/>
+                    <a:p>
+                      <a:pPr algn="ctr"/>
+                      <a:endParaRPr lang="fr-FR" sz="600" b="0"/>
+                    </a:p>
+                  </a:txBody>
+                  <a:tcPr marL="0" marR="0" marT="0" marB="0" anchor="ctr"/>
+                </a:tc>
+                <a:tc>
+                  <a:txBody>
+                    <a:bodyPr/>
+                    <a:lstStyle/>
+                    <a:p>
+                      <a:pPr algn="ctr"/>
+                      <a:endParaRPr lang="fr-FR" sz="600" b="0"/>
+                    </a:p>
+                  </a:txBody>
+                  <a:tcPr marL="0" marR="0" marT="0" marB="0" anchor="ctr"/>
+                </a:tc>
+                <a:tc>
+                  <a:txBody>
+                    <a:bodyPr/>
+                    <a:lstStyle/>
+                    <a:p>
+                      <a:pPr algn="ctr"/>
+                      <a:endParaRPr lang="fr-FR" sz="600" b="0" dirty="0"/>
+                    </a:p>
+                  </a:txBody>
+                  <a:tcPr marL="0" marR="0" marT="0" marB="0" anchor="ctr"/>
+                </a:tc>
+                <a:tc>
+                  <a:txBody>
+                    <a:bodyPr/>
+                    <a:lstStyle/>
+                    <a:p>
+                      <a:pPr algn="ctr"/>
+                      <a:endParaRPr lang="fr-FR" sz="600" b="0" dirty="0"/>
+                    </a:p>
+                  </a:txBody>
+                  <a:tcPr marL="0" marR="0" marT="0" marB="0" anchor="ctr"/>
+                </a:tc>
+                <a:extLst>
+                  <a:ext uri="{0D108BD9-81ED-4DB2-BD59-A6C34878D82A}">
+                    <a16:rowId xmlns:a16="http://schemas.microsoft.com/office/drawing/2014/main" val="169265387"/>
+                  </a:ext>
+                </a:extLst>
+              </a:tr>
+            </a:tbl>
+          </a:graphicData>
+        </a:graphic>
+      </p:graphicFrame>
+      <p:graphicFrame>
+        <p:nvGraphicFramePr>
+          <p:cNvPr id="36" name="Tableau 35">
+            <a:extLst>
+              <a:ext uri="{FF2B5EF4-FFF2-40B4-BE49-F238E27FC236}">
+                <a16:creationId xmlns:a16="http://schemas.microsoft.com/office/drawing/2014/main" id="{0BF9E167-860A-ADE6-9DA5-F9ADBE894A66}"/>
+              </a:ext>
+            </a:extLst>
+          </p:cNvPr>
+          <p:cNvGraphicFramePr>
+            <a:graphicFrameLocks noGrp="1"/>
+          </p:cNvGraphicFramePr>
+          <p:nvPr>
+            <p:extLst>
+              <p:ext uri="{D42A27DB-BD31-4B8C-83A1-F6EECF244321}">
+                <p14:modId xmlns:p14="http://schemas.microsoft.com/office/powerpoint/2010/main" val="295148436"/>
+              </p:ext>
+            </p:extLst>
+          </p:nvPr>
+        </p:nvGraphicFramePr>
+        <p:xfrm>
+          <a:off x="6845045" y="4810526"/>
+          <a:ext cx="1883728" cy="748596"/>
+        </p:xfrm>
+        <a:graphic>
+          <a:graphicData uri="http://schemas.openxmlformats.org/drawingml/2006/table">
+            <a:tbl>
+              <a:tblPr firstRow="1">
+                <a:tableStyleId>{284E427A-3D55-4303-BF80-6455036E1DE7}</a:tableStyleId>
+              </a:tblPr>
+              <a:tblGrid>
+                <a:gridCol w="269104">
+                  <a:extLst>
+                    <a:ext uri="{9D8B030D-6E8A-4147-A177-3AD203B41FA5}">
+                      <a16:colId xmlns:a16="http://schemas.microsoft.com/office/drawing/2014/main" val="3629675326"/>
+                    </a:ext>
+                  </a:extLst>
+                </a:gridCol>
+                <a:gridCol w="269104">
+                  <a:extLst>
+                    <a:ext uri="{9D8B030D-6E8A-4147-A177-3AD203B41FA5}">
+                      <a16:colId xmlns:a16="http://schemas.microsoft.com/office/drawing/2014/main" val="1638662622"/>
+                    </a:ext>
+                  </a:extLst>
+                </a:gridCol>
+                <a:gridCol w="269104">
+                  <a:extLst>
+                    <a:ext uri="{9D8B030D-6E8A-4147-A177-3AD203B41FA5}">
+                      <a16:colId xmlns:a16="http://schemas.microsoft.com/office/drawing/2014/main" val="3571151943"/>
+                    </a:ext>
+                  </a:extLst>
+                </a:gridCol>
+                <a:gridCol w="269104">
+                  <a:extLst>
+                    <a:ext uri="{9D8B030D-6E8A-4147-A177-3AD203B41FA5}">
+                      <a16:colId xmlns:a16="http://schemas.microsoft.com/office/drawing/2014/main" val="1566257407"/>
+                    </a:ext>
+                  </a:extLst>
+                </a:gridCol>
+                <a:gridCol w="269104">
+                  <a:extLst>
+                    <a:ext uri="{9D8B030D-6E8A-4147-A177-3AD203B41FA5}">
+                      <a16:colId xmlns:a16="http://schemas.microsoft.com/office/drawing/2014/main" val="684904652"/>
+                    </a:ext>
+                  </a:extLst>
+                </a:gridCol>
+                <a:gridCol w="269104">
+                  <a:extLst>
+                    <a:ext uri="{9D8B030D-6E8A-4147-A177-3AD203B41FA5}">
+                      <a16:colId xmlns:a16="http://schemas.microsoft.com/office/drawing/2014/main" val="2045673248"/>
+                    </a:ext>
+                  </a:extLst>
+                </a:gridCol>
+                <a:gridCol w="269104">
+                  <a:extLst>
+                    <a:ext uri="{9D8B030D-6E8A-4147-A177-3AD203B41FA5}">
+                      <a16:colId xmlns:a16="http://schemas.microsoft.com/office/drawing/2014/main" val="4108038552"/>
+                    </a:ext>
+                  </a:extLst>
+                </a:gridCol>
+              </a:tblGrid>
+              <a:tr h="249532">
+                <a:tc>
+                  <a:txBody>
+                    <a:bodyPr/>
+                    <a:lstStyle/>
+                    <a:p>
+                      <a:pPr algn="ctr"/>
+                      <a:endParaRPr lang="fr-FR" sz="600" b="0" dirty="0"/>
+                    </a:p>
+                  </a:txBody>
+                  <a:tcPr marL="0" marR="0" marT="0" marB="0" anchor="ctr"/>
+                </a:tc>
+                <a:tc>
+                  <a:txBody>
+                    <a:bodyPr/>
+                    <a:lstStyle/>
+                    <a:p>
+                      <a:pPr algn="ctr"/>
+                      <a:endParaRPr lang="fr-FR" sz="600" b="0" dirty="0"/>
+                    </a:p>
+                  </a:txBody>
+                  <a:tcPr marL="0" marR="0" marT="0" marB="0" anchor="ctr"/>
+                </a:tc>
+                <a:tc>
+                  <a:txBody>
+                    <a:bodyPr/>
+                    <a:lstStyle/>
+                    <a:p>
+                      <a:pPr algn="ctr"/>
+                      <a:endParaRPr lang="fr-FR" sz="600" b="0" dirty="0"/>
+                    </a:p>
+                  </a:txBody>
+                  <a:tcPr marL="0" marR="0" marT="0" marB="0" anchor="ctr"/>
+                </a:tc>
+                <a:tc>
+                  <a:txBody>
+                    <a:bodyPr/>
+                    <a:lstStyle/>
+                    <a:p>
+                      <a:pPr algn="ctr"/>
+                      <a:endParaRPr lang="fr-FR" sz="600" b="0" dirty="0"/>
+                    </a:p>
+                  </a:txBody>
+                  <a:tcPr marL="0" marR="0" marT="0" marB="0" anchor="ctr"/>
+                </a:tc>
+                <a:tc>
+                  <a:txBody>
+                    <a:bodyPr/>
+                    <a:lstStyle/>
+                    <a:p>
+                      <a:pPr algn="ctr"/>
+                      <a:endParaRPr lang="fr-FR" sz="600" b="0" dirty="0"/>
+                    </a:p>
+                  </a:txBody>
+                  <a:tcPr marL="0" marR="0" marT="0" marB="0" anchor="ctr"/>
+                </a:tc>
+                <a:tc>
+                  <a:txBody>
+                    <a:bodyPr/>
+                    <a:lstStyle/>
+                    <a:p>
+                      <a:pPr algn="ctr"/>
+                      <a:endParaRPr lang="fr-FR" sz="600" b="0" dirty="0"/>
+                    </a:p>
+                  </a:txBody>
+                  <a:tcPr marL="0" marR="0" marT="0" marB="0" anchor="ctr"/>
+                </a:tc>
+                <a:tc>
+                  <a:txBody>
+                    <a:bodyPr/>
+                    <a:lstStyle/>
+                    <a:p>
+                      <a:pPr algn="ctr"/>
+                      <a:endParaRPr lang="fr-FR" sz="600" b="0" dirty="0"/>
+                    </a:p>
+                  </a:txBody>
+                  <a:tcPr marL="0" marR="0" marT="0" marB="0" anchor="ctr"/>
+                </a:tc>
+                <a:extLst>
+                  <a:ext uri="{0D108BD9-81ED-4DB2-BD59-A6C34878D82A}">
+                    <a16:rowId xmlns:a16="http://schemas.microsoft.com/office/drawing/2014/main" val="401024579"/>
+                  </a:ext>
+                </a:extLst>
+              </a:tr>
+              <a:tr h="249532">
+                <a:tc>
+                  <a:txBody>
+                    <a:bodyPr/>
+                    <a:lstStyle/>
+                    <a:p>
+                      <a:pPr algn="ctr"/>
+                      <a:endParaRPr lang="fr-FR" sz="600" b="0" dirty="0"/>
+                    </a:p>
+                  </a:txBody>
+                  <a:tcPr marL="0" marR="0" marT="0" marB="0" anchor="ctr"/>
+                </a:tc>
+                <a:tc>
+                  <a:txBody>
+                    <a:bodyPr/>
+                    <a:lstStyle/>
+                    <a:p>
+                      <a:pPr algn="ctr"/>
+                      <a:endParaRPr lang="fr-FR" sz="600" b="0" dirty="0"/>
+                    </a:p>
+                  </a:txBody>
+                  <a:tcPr marL="0" marR="0" marT="0" marB="0" anchor="ctr"/>
+                </a:tc>
+                <a:tc>
+                  <a:txBody>
+                    <a:bodyPr/>
+                    <a:lstStyle/>
+                    <a:p>
+                      <a:pPr algn="ctr"/>
+                      <a:endParaRPr lang="fr-FR" sz="600" b="0" dirty="0"/>
+                    </a:p>
+                  </a:txBody>
+                  <a:tcPr marL="0" marR="0" marT="0" marB="0" anchor="ctr"/>
+                </a:tc>
+                <a:tc>
+                  <a:txBody>
+                    <a:bodyPr/>
+                    <a:lstStyle/>
+                    <a:p>
+                      <a:pPr algn="ctr"/>
+                      <a:endParaRPr lang="fr-FR" sz="600" b="0"/>
+                    </a:p>
+                  </a:txBody>
+                  <a:tcPr marL="0" marR="0" marT="0" marB="0" anchor="ctr"/>
+                </a:tc>
+                <a:tc>
+                  <a:txBody>
+                    <a:bodyPr/>
+                    <a:lstStyle/>
+                    <a:p>
+                      <a:pPr algn="ctr"/>
+                      <a:endParaRPr lang="fr-FR" sz="600" b="0"/>
+                    </a:p>
+                  </a:txBody>
+                  <a:tcPr marL="0" marR="0" marT="0" marB="0" anchor="ctr"/>
+                </a:tc>
+                <a:tc>
+                  <a:txBody>
+                    <a:bodyPr/>
+                    <a:lstStyle/>
+                    <a:p>
+                      <a:pPr algn="ctr"/>
+                      <a:endParaRPr lang="fr-FR" sz="600" b="0"/>
+                    </a:p>
+                  </a:txBody>
+                  <a:tcPr marL="0" marR="0" marT="0" marB="0" anchor="ctr"/>
+                </a:tc>
+                <a:tc>
+                  <a:txBody>
+                    <a:bodyPr/>
+                    <a:lstStyle/>
+                    <a:p>
+                      <a:pPr algn="ctr"/>
+                      <a:endParaRPr lang="fr-FR" sz="600" b="0"/>
+                    </a:p>
+                  </a:txBody>
+                  <a:tcPr marL="0" marR="0" marT="0" marB="0" anchor="ctr"/>
+                </a:tc>
+                <a:extLst>
+                  <a:ext uri="{0D108BD9-81ED-4DB2-BD59-A6C34878D82A}">
+                    <a16:rowId xmlns:a16="http://schemas.microsoft.com/office/drawing/2014/main" val="464496667"/>
+                  </a:ext>
+                </a:extLst>
+              </a:tr>
+              <a:tr h="249532">
+                <a:tc>
+                  <a:txBody>
+                    <a:bodyPr/>
+                    <a:lstStyle/>
+                    <a:p>
+                      <a:pPr algn="ctr"/>
+                      <a:endParaRPr lang="fr-FR" sz="600" b="0" dirty="0"/>
+                    </a:p>
+                  </a:txBody>
+                  <a:tcPr marL="0" marR="0" marT="0" marB="0" anchor="ctr"/>
+                </a:tc>
+                <a:tc>
+                  <a:txBody>
+                    <a:bodyPr/>
+                    <a:lstStyle/>
+                    <a:p>
+                      <a:pPr algn="ctr"/>
+                      <a:endParaRPr lang="fr-FR" sz="600" b="0"/>
+                    </a:p>
+                  </a:txBody>
+                  <a:tcPr marL="0" marR="0" marT="0" marB="0" anchor="ctr"/>
+                </a:tc>
+                <a:tc>
+                  <a:txBody>
+                    <a:bodyPr/>
+                    <a:lstStyle/>
+                    <a:p>
+                      <a:pPr algn="ctr"/>
+                      <a:endParaRPr lang="fr-FR" sz="600" b="0" dirty="0"/>
+                    </a:p>
+                  </a:txBody>
+                  <a:tcPr marL="0" marR="0" marT="0" marB="0" anchor="ctr"/>
+                </a:tc>
+                <a:tc>
+                  <a:txBody>
+                    <a:bodyPr/>
+                    <a:lstStyle/>
+                    <a:p>
+                      <a:pPr algn="ctr"/>
+                      <a:endParaRPr lang="fr-FR" sz="600" b="0" dirty="0"/>
+                    </a:p>
+                  </a:txBody>
+                  <a:tcPr marL="0" marR="0" marT="0" marB="0" anchor="ctr"/>
+                </a:tc>
+                <a:tc>
+                  <a:txBody>
+                    <a:bodyPr/>
+                    <a:lstStyle/>
+                    <a:p>
+                      <a:pPr algn="ctr"/>
+                      <a:endParaRPr lang="fr-FR" sz="600" b="0" dirty="0"/>
+                    </a:p>
+                  </a:txBody>
+                  <a:tcPr marL="0" marR="0" marT="0" marB="0" anchor="ctr"/>
+                </a:tc>
+                <a:tc>
+                  <a:txBody>
+                    <a:bodyPr/>
+                    <a:lstStyle/>
+                    <a:p>
+                      <a:pPr algn="ctr"/>
+                      <a:endParaRPr lang="fr-FR" sz="600" b="0" dirty="0"/>
+                    </a:p>
+                  </a:txBody>
+                  <a:tcPr marL="0" marR="0" marT="0" marB="0" anchor="ctr"/>
+                </a:tc>
+                <a:tc>
+                  <a:txBody>
+                    <a:bodyPr/>
+                    <a:lstStyle/>
+                    <a:p>
+                      <a:pPr algn="ctr"/>
+                      <a:endParaRPr lang="fr-FR" sz="600" b="0" dirty="0"/>
+                    </a:p>
+                  </a:txBody>
+                  <a:tcPr marL="0" marR="0" marT="0" marB="0" anchor="ctr"/>
+                </a:tc>
+                <a:extLst>
+                  <a:ext uri="{0D108BD9-81ED-4DB2-BD59-A6C34878D82A}">
+                    <a16:rowId xmlns:a16="http://schemas.microsoft.com/office/drawing/2014/main" val="169265387"/>
+                  </a:ext>
+                </a:extLst>
+              </a:tr>
+            </a:tbl>
+          </a:graphicData>
+        </a:graphic>
+      </p:graphicFrame>
+      <p:sp>
+        <p:nvSpPr>
+          <p:cNvPr id="37" name="ZoneTexte 36">
+            <a:extLst>
+              <a:ext uri="{FF2B5EF4-FFF2-40B4-BE49-F238E27FC236}">
+                <a16:creationId xmlns:a16="http://schemas.microsoft.com/office/drawing/2014/main" id="{024520E0-77F3-AA10-56D5-C8BB32BBC371}"/>
+              </a:ext>
+            </a:extLst>
+          </p:cNvPr>
+          <p:cNvSpPr txBox="1"/>
+          <p:nvPr/>
+        </p:nvSpPr>
+        <p:spPr>
+          <a:xfrm>
+            <a:off x="4574636" y="4452477"/>
+            <a:ext cx="1006415" cy="169277"/>
+          </a:xfrm>
+          <a:prstGeom prst="rect">
+            <a:avLst/>
+          </a:prstGeom>
+          <a:noFill/>
+        </p:spPr>
+        <p:txBody>
+          <a:bodyPr wrap="square" lIns="0" tIns="0" rtlCol="0">
+            <a:spAutoFit/>
+          </a:bodyPr>
+          <a:lstStyle/>
+          <a:p>
+            <a:r>
+              <a:rPr lang="en-GB" sz="800" b="1" dirty="0">
+                <a:solidFill>
+                  <a:schemeClr val="accent2"/>
+                </a:solidFill>
+              </a:rPr>
+              <a:t>Seidel coefficients</a:t>
+            </a:r>
+          </a:p>
+        </p:txBody>
+      </p:sp>
+      <p:sp>
+        <p:nvSpPr>
+          <p:cNvPr id="38" name="ZoneTexte 37">
+            <a:extLst>
+              <a:ext uri="{FF2B5EF4-FFF2-40B4-BE49-F238E27FC236}">
+                <a16:creationId xmlns:a16="http://schemas.microsoft.com/office/drawing/2014/main" id="{7D42AD2F-B674-F830-2C2B-C54B149AED4F}"/>
+              </a:ext>
+            </a:extLst>
+          </p:cNvPr>
+          <p:cNvSpPr txBox="1"/>
+          <p:nvPr/>
+        </p:nvSpPr>
+        <p:spPr>
+          <a:xfrm>
+            <a:off x="6845045" y="4452476"/>
+            <a:ext cx="1498855" cy="169277"/>
+          </a:xfrm>
+          <a:prstGeom prst="rect">
+            <a:avLst/>
+          </a:prstGeom>
+          <a:noFill/>
+        </p:spPr>
+        <p:txBody>
+          <a:bodyPr wrap="square" lIns="0" tIns="0" rtlCol="0">
+            <a:spAutoFit/>
+          </a:bodyPr>
+          <a:lstStyle/>
+          <a:p>
+            <a:r>
+              <a:rPr lang="en-GB" sz="800" b="1" dirty="0">
+                <a:solidFill>
+                  <a:schemeClr val="accent2"/>
+                </a:solidFill>
+              </a:rPr>
+              <a:t>Zernike coefficients</a:t>
+            </a:r>
+          </a:p>
+        </p:txBody>
+      </p:sp>
     </p:spTree>
     <p:extLst>
       <p:ext uri="{BB962C8B-B14F-4D97-AF65-F5344CB8AC3E}">
@@ -25629,13 +26381,13 @@
           <p:nvPr>
             <p:extLst>
               <p:ext uri="{D42A27DB-BD31-4B8C-83A1-F6EECF244321}">
-                <p14:modId xmlns:p14="http://schemas.microsoft.com/office/powerpoint/2010/main" val="2035504600"/>
+                <p14:modId xmlns:p14="http://schemas.microsoft.com/office/powerpoint/2010/main" val="1543241449"/>
               </p:ext>
             </p:extLst>
           </p:nvPr>
         </p:nvGraphicFramePr>
         <p:xfrm>
-          <a:off x="6857146" y="4498366"/>
+          <a:off x="6857146" y="4681246"/>
           <a:ext cx="1883728" cy="748596"/>
         </p:xfrm>
         <a:graphic>
@@ -25990,7 +26742,7 @@
         </p:nvGrpSpPr>
         <p:grpSpPr>
           <a:xfrm>
-            <a:off x="7718072" y="5339128"/>
+            <a:off x="7718072" y="5522008"/>
             <a:ext cx="1022802" cy="169277"/>
             <a:chOff x="4556577" y="4600696"/>
             <a:chExt cx="1022802" cy="169277"/>
@@ -26130,7 +26882,7 @@
         </p:nvSpPr>
         <p:spPr>
           <a:xfrm>
-            <a:off x="6918197" y="5371467"/>
+            <a:off x="6918197" y="5554347"/>
             <a:ext cx="1006415" cy="123111"/>
           </a:xfrm>
           <a:prstGeom prst="rect">
@@ -26210,6 +26962,45 @@
             <a:r>
               <a:rPr lang="en-GB" sz="600" dirty="0"/>
               <a:t>Print all results</a:t>
+            </a:r>
+          </a:p>
+        </p:txBody>
+      </p:sp>
+      <p:sp>
+        <p:nvSpPr>
+          <p:cNvPr id="7" name="ZoneTexte 6">
+            <a:extLst>
+              <a:ext uri="{FF2B5EF4-FFF2-40B4-BE49-F238E27FC236}">
+                <a16:creationId xmlns:a16="http://schemas.microsoft.com/office/drawing/2014/main" id="{8F246501-CDD8-A349-6CB4-523290AD1085}"/>
+              </a:ext>
+            </a:extLst>
+          </p:cNvPr>
+          <p:cNvSpPr txBox="1"/>
+          <p:nvPr/>
+        </p:nvSpPr>
+        <p:spPr>
+          <a:xfrm>
+            <a:off x="6804079" y="4432800"/>
+            <a:ext cx="1006415" cy="169277"/>
+          </a:xfrm>
+          <a:prstGeom prst="rect">
+            <a:avLst/>
+          </a:prstGeom>
+          <a:noFill/>
+        </p:spPr>
+        <p:txBody>
+          <a:bodyPr wrap="square" lIns="0" tIns="0" rtlCol="0">
+            <a:spAutoFit/>
+          </a:bodyPr>
+          <a:lstStyle/>
+          <a:p>
+            <a:r>
+              <a:rPr lang="en-GB" sz="800" b="1" dirty="0">
+                <a:solidFill>
+                  <a:schemeClr val="accent2"/>
+                </a:solidFill>
+              </a:rPr>
+              <a:t>Results</a:t>
             </a:r>
           </a:p>
         </p:txBody>

</xml_diff>